<commit_message>
Added high level architecture portions.
</commit_message>
<xml_diff>
--- a/docs/W-9 Working Document/W-9.3 Presentation Slides/Phase1/vms_first_presentation_v0.1a.pptx
+++ b/docs/W-9 Working Document/W-9.3 Presentation Slides/Phase1/vms_first_presentation_v0.1a.pptx
@@ -5,10 +5,10 @@
     <p:sldMasterId id="2147483652" r:id="rId1"/>
   </p:sldMasterIdLst>
   <p:notesMasterIdLst>
-    <p:notesMasterId r:id="rId26"/>
+    <p:notesMasterId r:id="rId28"/>
   </p:notesMasterIdLst>
   <p:handoutMasterIdLst>
-    <p:handoutMasterId r:id="rId27"/>
+    <p:handoutMasterId r:id="rId29"/>
   </p:handoutMasterIdLst>
   <p:sldIdLst>
     <p:sldId id="256" r:id="rId2"/>
@@ -29,12 +29,14 @@
     <p:sldId id="262" r:id="rId17"/>
     <p:sldId id="279" r:id="rId18"/>
     <p:sldId id="265" r:id="rId19"/>
-    <p:sldId id="280" r:id="rId20"/>
-    <p:sldId id="264" r:id="rId21"/>
-    <p:sldId id="281" r:id="rId22"/>
-    <p:sldId id="284" r:id="rId23"/>
-    <p:sldId id="283" r:id="rId24"/>
-    <p:sldId id="282" r:id="rId25"/>
+    <p:sldId id="286" r:id="rId20"/>
+    <p:sldId id="285" r:id="rId21"/>
+    <p:sldId id="280" r:id="rId22"/>
+    <p:sldId id="264" r:id="rId23"/>
+    <p:sldId id="281" r:id="rId24"/>
+    <p:sldId id="284" r:id="rId25"/>
+    <p:sldId id="283" r:id="rId26"/>
+    <p:sldId id="282" r:id="rId27"/>
   </p:sldIdLst>
   <p:sldSz cx="9144000" cy="6858000" type="screen4x3"/>
   <p:notesSz cx="7010400" cy="9296400"/>
@@ -3398,6 +3400,13 @@
         </dgm:presLayoutVars>
       </dgm:prSet>
       <dgm:spPr/>
+      <dgm:t>
+        <a:bodyPr/>
+        <a:lstStyle/>
+        <a:p>
+          <a:endParaRPr lang="en-US"/>
+        </a:p>
+      </dgm:t>
     </dgm:pt>
     <dgm:pt modelId="{2AC9D863-F73C-450B-9D85-60B005DA622F}" type="pres">
       <dgm:prSet presAssocID="{885613C5-7A76-4AA0-92F0-EEDD9B446661}" presName="parentLin" presStyleCnt="0"/>
@@ -3406,6 +3415,13 @@
     <dgm:pt modelId="{81666E97-5860-45F1-88A5-99FAA589A582}" type="pres">
       <dgm:prSet presAssocID="{885613C5-7A76-4AA0-92F0-EEDD9B446661}" presName="parentLeftMargin" presStyleLbl="node1" presStyleIdx="0" presStyleCnt="5"/>
       <dgm:spPr/>
+      <dgm:t>
+        <a:bodyPr/>
+        <a:lstStyle/>
+        <a:p>
+          <a:endParaRPr lang="en-US"/>
+        </a:p>
+      </dgm:t>
     </dgm:pt>
     <dgm:pt modelId="{E1A9A929-FEE8-4155-9F48-FAC5EE533310}" type="pres">
       <dgm:prSet presAssocID="{885613C5-7A76-4AA0-92F0-EEDD9B446661}" presName="parentText" presStyleLbl="node1" presStyleIdx="0" presStyleCnt="5">
@@ -3415,6 +3431,13 @@
         </dgm:presLayoutVars>
       </dgm:prSet>
       <dgm:spPr/>
+      <dgm:t>
+        <a:bodyPr/>
+        <a:lstStyle/>
+        <a:p>
+          <a:endParaRPr lang="en-US"/>
+        </a:p>
+      </dgm:t>
     </dgm:pt>
     <dgm:pt modelId="{D56B0920-15E2-4004-802C-40F44EE50B32}" type="pres">
       <dgm:prSet presAssocID="{885613C5-7A76-4AA0-92F0-EEDD9B446661}" presName="negativeSpace" presStyleCnt="0"/>
@@ -3439,6 +3462,13 @@
     <dgm:pt modelId="{21C03DFF-8234-4BBD-95B9-2622D999B6CC}" type="pres">
       <dgm:prSet presAssocID="{68CDD154-F438-49AE-AED8-77DB9EC9D634}" presName="parentLeftMargin" presStyleLbl="node1" presStyleIdx="0" presStyleCnt="5"/>
       <dgm:spPr/>
+      <dgm:t>
+        <a:bodyPr/>
+        <a:lstStyle/>
+        <a:p>
+          <a:endParaRPr lang="en-US"/>
+        </a:p>
+      </dgm:t>
     </dgm:pt>
     <dgm:pt modelId="{66C22AF7-7E37-41D2-944C-F904CFD2965B}" type="pres">
       <dgm:prSet presAssocID="{68CDD154-F438-49AE-AED8-77DB9EC9D634}" presName="parentText" presStyleLbl="node1" presStyleIdx="1" presStyleCnt="5">
@@ -3448,6 +3478,13 @@
         </dgm:presLayoutVars>
       </dgm:prSet>
       <dgm:spPr/>
+      <dgm:t>
+        <a:bodyPr/>
+        <a:lstStyle/>
+        <a:p>
+          <a:endParaRPr lang="en-US"/>
+        </a:p>
+      </dgm:t>
     </dgm:pt>
     <dgm:pt modelId="{C06D8DE2-402D-435C-802A-B654C27DCCEC}" type="pres">
       <dgm:prSet presAssocID="{68CDD154-F438-49AE-AED8-77DB9EC9D634}" presName="negativeSpace" presStyleCnt="0"/>
@@ -3472,6 +3509,13 @@
     <dgm:pt modelId="{0BB3654B-9C6D-4A61-87CC-E802B5686BC1}" type="pres">
       <dgm:prSet presAssocID="{89B52B6D-D82C-42B0-BE38-A3B3D68F9C27}" presName="parentLeftMargin" presStyleLbl="node1" presStyleIdx="1" presStyleCnt="5"/>
       <dgm:spPr/>
+      <dgm:t>
+        <a:bodyPr/>
+        <a:lstStyle/>
+        <a:p>
+          <a:endParaRPr lang="en-US"/>
+        </a:p>
+      </dgm:t>
     </dgm:pt>
     <dgm:pt modelId="{FB899ED4-0995-40A2-A345-468203D60C81}" type="pres">
       <dgm:prSet presAssocID="{89B52B6D-D82C-42B0-BE38-A3B3D68F9C27}" presName="parentText" presStyleLbl="node1" presStyleIdx="2" presStyleCnt="5">
@@ -3481,6 +3525,13 @@
         </dgm:presLayoutVars>
       </dgm:prSet>
       <dgm:spPr/>
+      <dgm:t>
+        <a:bodyPr/>
+        <a:lstStyle/>
+        <a:p>
+          <a:endParaRPr lang="en-US"/>
+        </a:p>
+      </dgm:t>
     </dgm:pt>
     <dgm:pt modelId="{868AE5E0-B723-46BA-9B8A-7BDE27FDAC96}" type="pres">
       <dgm:prSet presAssocID="{89B52B6D-D82C-42B0-BE38-A3B3D68F9C27}" presName="negativeSpace" presStyleCnt="0"/>
@@ -3505,6 +3556,13 @@
     <dgm:pt modelId="{C6C87D8D-4034-4397-984C-9BF8EEE0A79B}" type="pres">
       <dgm:prSet presAssocID="{4209E399-DA0C-42D5-962A-8276C02AA8EC}" presName="parentLeftMargin" presStyleLbl="node1" presStyleIdx="2" presStyleCnt="5"/>
       <dgm:spPr/>
+      <dgm:t>
+        <a:bodyPr/>
+        <a:lstStyle/>
+        <a:p>
+          <a:endParaRPr lang="en-US"/>
+        </a:p>
+      </dgm:t>
     </dgm:pt>
     <dgm:pt modelId="{44B548FB-45D5-465C-AA05-763364E65BC9}" type="pres">
       <dgm:prSet presAssocID="{4209E399-DA0C-42D5-962A-8276C02AA8EC}" presName="parentText" presStyleLbl="node1" presStyleIdx="3" presStyleCnt="5">
@@ -3514,6 +3572,13 @@
         </dgm:presLayoutVars>
       </dgm:prSet>
       <dgm:spPr/>
+      <dgm:t>
+        <a:bodyPr/>
+        <a:lstStyle/>
+        <a:p>
+          <a:endParaRPr lang="en-US"/>
+        </a:p>
+      </dgm:t>
     </dgm:pt>
     <dgm:pt modelId="{2B688452-9676-4572-8FCC-7EBB2177883D}" type="pres">
       <dgm:prSet presAssocID="{4209E399-DA0C-42D5-962A-8276C02AA8EC}" presName="negativeSpace" presStyleCnt="0"/>
@@ -3538,6 +3603,13 @@
     <dgm:pt modelId="{8ED20E6A-F08F-4955-95AA-301A4ACB2F6E}" type="pres">
       <dgm:prSet presAssocID="{BF9A83B9-8111-4B78-8600-312D1688C140}" presName="parentLeftMargin" presStyleLbl="node1" presStyleIdx="3" presStyleCnt="5"/>
       <dgm:spPr/>
+      <dgm:t>
+        <a:bodyPr/>
+        <a:lstStyle/>
+        <a:p>
+          <a:endParaRPr lang="en-US"/>
+        </a:p>
+      </dgm:t>
     </dgm:pt>
     <dgm:pt modelId="{25B48118-6B58-4064-9C50-F7B4852148FC}" type="pres">
       <dgm:prSet presAssocID="{BF9A83B9-8111-4B78-8600-312D1688C140}" presName="parentText" presStyleLbl="node1" presStyleIdx="4" presStyleCnt="5">
@@ -3547,6 +3619,13 @@
         </dgm:presLayoutVars>
       </dgm:prSet>
       <dgm:spPr/>
+      <dgm:t>
+        <a:bodyPr/>
+        <a:lstStyle/>
+        <a:p>
+          <a:endParaRPr lang="en-US"/>
+        </a:p>
+      </dgm:t>
     </dgm:pt>
     <dgm:pt modelId="{8C709240-4DF1-42AB-B93B-B126A518580F}" type="pres">
       <dgm:prSet presAssocID="{BF9A83B9-8111-4B78-8600-312D1688C140}" presName="negativeSpace" presStyleCnt="0"/>
@@ -3562,22 +3641,22 @@
     </dgm:pt>
   </dgm:ptLst>
   <dgm:cxnLst>
-    <dgm:cxn modelId="{41B59570-FE80-4E7F-9E79-0C4F1EE64B49}" srcId="{EF1F78ED-E9D5-44E4-97D4-B3FEFD902986}" destId="{885613C5-7A76-4AA0-92F0-EEDD9B446661}" srcOrd="0" destOrd="0" parTransId="{A964CD41-1FAB-4DC7-BFB1-8EFFD3ADEC73}" sibTransId="{6C21FB75-BC17-41CC-880D-0FB92EFFD8D8}"/>
+    <dgm:cxn modelId="{A3C9F58B-A2EE-444B-90C0-FC02C3F66175}" type="presOf" srcId="{885613C5-7A76-4AA0-92F0-EEDD9B446661}" destId="{81666E97-5860-45F1-88A5-99FAA589A582}" srcOrd="0" destOrd="0" presId="urn:microsoft.com/office/officeart/2005/8/layout/list1"/>
+    <dgm:cxn modelId="{26E52850-E159-4B84-9BAE-D590FD1CD455}" type="presOf" srcId="{4209E399-DA0C-42D5-962A-8276C02AA8EC}" destId="{44B548FB-45D5-465C-AA05-763364E65BC9}" srcOrd="1" destOrd="0" presId="urn:microsoft.com/office/officeart/2005/8/layout/list1"/>
     <dgm:cxn modelId="{FFD1B7FF-14F9-4CBB-8E58-FD9C5F7FEADE}" type="presOf" srcId="{68CDD154-F438-49AE-AED8-77DB9EC9D634}" destId="{66C22AF7-7E37-41D2-944C-F904CFD2965B}" srcOrd="1" destOrd="0" presId="urn:microsoft.com/office/officeart/2005/8/layout/list1"/>
-    <dgm:cxn modelId="{D6122ACD-1685-43B1-9C5B-E1326B60B129}" type="presOf" srcId="{EF1F78ED-E9D5-44E4-97D4-B3FEFD902986}" destId="{DD69F0F8-C7C4-4EF4-8C1C-51E0155113CE}" srcOrd="0" destOrd="0" presId="urn:microsoft.com/office/officeart/2005/8/layout/list1"/>
-    <dgm:cxn modelId="{EAD8F820-CBC1-48D7-A8A9-64A6FBEB2CD0}" type="presOf" srcId="{68CDD154-F438-49AE-AED8-77DB9EC9D634}" destId="{21C03DFF-8234-4BBD-95B9-2622D999B6CC}" srcOrd="0" destOrd="0" presId="urn:microsoft.com/office/officeart/2005/8/layout/list1"/>
     <dgm:cxn modelId="{60E6AA33-A858-4310-A69D-E844E3184D77}" type="presOf" srcId="{4209E399-DA0C-42D5-962A-8276C02AA8EC}" destId="{C6C87D8D-4034-4397-984C-9BF8EEE0A79B}" srcOrd="0" destOrd="0" presId="urn:microsoft.com/office/officeart/2005/8/layout/list1"/>
-    <dgm:cxn modelId="{9797B96C-17EB-46FB-9167-2BD4C6C8E8B2}" type="presOf" srcId="{BF9A83B9-8111-4B78-8600-312D1688C140}" destId="{8ED20E6A-F08F-4955-95AA-301A4ACB2F6E}" srcOrd="0" destOrd="0" presId="urn:microsoft.com/office/officeart/2005/8/layout/list1"/>
-    <dgm:cxn modelId="{C9E4C59F-1A71-4E66-84D4-AE84CE96437F}" type="presOf" srcId="{885613C5-7A76-4AA0-92F0-EEDD9B446661}" destId="{E1A9A929-FEE8-4155-9F48-FAC5EE533310}" srcOrd="1" destOrd="0" presId="urn:microsoft.com/office/officeart/2005/8/layout/list1"/>
-    <dgm:cxn modelId="{A3C9F58B-A2EE-444B-90C0-FC02C3F66175}" type="presOf" srcId="{885613C5-7A76-4AA0-92F0-EEDD9B446661}" destId="{81666E97-5860-45F1-88A5-99FAA589A582}" srcOrd="0" destOrd="0" presId="urn:microsoft.com/office/officeart/2005/8/layout/list1"/>
     <dgm:cxn modelId="{FDB03FEE-AFCB-4EB7-9D72-88B81A1DCBC1}" srcId="{EF1F78ED-E9D5-44E4-97D4-B3FEFD902986}" destId="{4209E399-DA0C-42D5-962A-8276C02AA8EC}" srcOrd="3" destOrd="0" parTransId="{7ED4465C-CF67-468F-ABD7-F54F46BB659F}" sibTransId="{F7F538C6-58F2-4EB2-9D5A-112410F40135}"/>
-    <dgm:cxn modelId="{48EEECB1-3112-4C42-87DF-4BFE0EF38A24}" type="presOf" srcId="{BF9A83B9-8111-4B78-8600-312D1688C140}" destId="{25B48118-6B58-4064-9C50-F7B4852148FC}" srcOrd="1" destOrd="0" presId="urn:microsoft.com/office/officeart/2005/8/layout/list1"/>
+    <dgm:cxn modelId="{C99778AD-4EA2-413E-988E-63DB77468AE8}" srcId="{EF1F78ED-E9D5-44E4-97D4-B3FEFD902986}" destId="{68CDD154-F438-49AE-AED8-77DB9EC9D634}" srcOrd="1" destOrd="0" parTransId="{80147D89-2F73-4A3C-8D2E-F94C278F0084}" sibTransId="{8E8D4616-98CD-450E-B33D-2C9FC2B13B55}"/>
     <dgm:cxn modelId="{F60FB540-C952-4949-8589-E734F5994257}" type="presOf" srcId="{89B52B6D-D82C-42B0-BE38-A3B3D68F9C27}" destId="{0BB3654B-9C6D-4A61-87CC-E802B5686BC1}" srcOrd="0" destOrd="0" presId="urn:microsoft.com/office/officeart/2005/8/layout/list1"/>
     <dgm:cxn modelId="{04B3E604-C413-457E-B68C-5144C6DC9915}" srcId="{EF1F78ED-E9D5-44E4-97D4-B3FEFD902986}" destId="{89B52B6D-D82C-42B0-BE38-A3B3D68F9C27}" srcOrd="2" destOrd="0" parTransId="{A5642D67-0660-487A-A1E2-D092914AC2EB}" sibTransId="{86F3C531-528D-49DB-9EB7-8C6D718BDBE9}"/>
-    <dgm:cxn modelId="{C99778AD-4EA2-413E-988E-63DB77468AE8}" srcId="{EF1F78ED-E9D5-44E4-97D4-B3FEFD902986}" destId="{68CDD154-F438-49AE-AED8-77DB9EC9D634}" srcOrd="1" destOrd="0" parTransId="{80147D89-2F73-4A3C-8D2E-F94C278F0084}" sibTransId="{8E8D4616-98CD-450E-B33D-2C9FC2B13B55}"/>
+    <dgm:cxn modelId="{EAD8F820-CBC1-48D7-A8A9-64A6FBEB2CD0}" type="presOf" srcId="{68CDD154-F438-49AE-AED8-77DB9EC9D634}" destId="{21C03DFF-8234-4BBD-95B9-2622D999B6CC}" srcOrd="0" destOrd="0" presId="urn:microsoft.com/office/officeart/2005/8/layout/list1"/>
+    <dgm:cxn modelId="{48EEECB1-3112-4C42-87DF-4BFE0EF38A24}" type="presOf" srcId="{BF9A83B9-8111-4B78-8600-312D1688C140}" destId="{25B48118-6B58-4064-9C50-F7B4852148FC}" srcOrd="1" destOrd="0" presId="urn:microsoft.com/office/officeart/2005/8/layout/list1"/>
+    <dgm:cxn modelId="{C9E4C59F-1A71-4E66-84D4-AE84CE96437F}" type="presOf" srcId="{885613C5-7A76-4AA0-92F0-EEDD9B446661}" destId="{E1A9A929-FEE8-4155-9F48-FAC5EE533310}" srcOrd="1" destOrd="0" presId="urn:microsoft.com/office/officeart/2005/8/layout/list1"/>
+    <dgm:cxn modelId="{8F58D411-B0D3-49B8-8DB2-4EA8C96091D5}" type="presOf" srcId="{89B52B6D-D82C-42B0-BE38-A3B3D68F9C27}" destId="{FB899ED4-0995-40A2-A345-468203D60C81}" srcOrd="1" destOrd="0" presId="urn:microsoft.com/office/officeart/2005/8/layout/list1"/>
+    <dgm:cxn modelId="{D6122ACD-1685-43B1-9C5B-E1326B60B129}" type="presOf" srcId="{EF1F78ED-E9D5-44E4-97D4-B3FEFD902986}" destId="{DD69F0F8-C7C4-4EF4-8C1C-51E0155113CE}" srcOrd="0" destOrd="0" presId="urn:microsoft.com/office/officeart/2005/8/layout/list1"/>
     <dgm:cxn modelId="{CB57BA4F-ABA8-48A9-9D26-B1279D4664BC}" srcId="{EF1F78ED-E9D5-44E4-97D4-B3FEFD902986}" destId="{BF9A83B9-8111-4B78-8600-312D1688C140}" srcOrd="4" destOrd="0" parTransId="{8FA8D553-4648-4D63-9876-6E7449F8F18A}" sibTransId="{9D0571FA-F277-43A1-BCD9-ED2072122346}"/>
-    <dgm:cxn modelId="{8F58D411-B0D3-49B8-8DB2-4EA8C96091D5}" type="presOf" srcId="{89B52B6D-D82C-42B0-BE38-A3B3D68F9C27}" destId="{FB899ED4-0995-40A2-A345-468203D60C81}" srcOrd="1" destOrd="0" presId="urn:microsoft.com/office/officeart/2005/8/layout/list1"/>
-    <dgm:cxn modelId="{26E52850-E159-4B84-9BAE-D590FD1CD455}" type="presOf" srcId="{4209E399-DA0C-42D5-962A-8276C02AA8EC}" destId="{44B548FB-45D5-465C-AA05-763364E65BC9}" srcOrd="1" destOrd="0" presId="urn:microsoft.com/office/officeart/2005/8/layout/list1"/>
+    <dgm:cxn modelId="{41B59570-FE80-4E7F-9E79-0C4F1EE64B49}" srcId="{EF1F78ED-E9D5-44E4-97D4-B3FEFD902986}" destId="{885613C5-7A76-4AA0-92F0-EEDD9B446661}" srcOrd="0" destOrd="0" parTransId="{A964CD41-1FAB-4DC7-BFB1-8EFFD3ADEC73}" sibTransId="{6C21FB75-BC17-41CC-880D-0FB92EFFD8D8}"/>
+    <dgm:cxn modelId="{9797B96C-17EB-46FB-9167-2BD4C6C8E8B2}" type="presOf" srcId="{BF9A83B9-8111-4B78-8600-312D1688C140}" destId="{8ED20E6A-F08F-4955-95AA-301A4ACB2F6E}" srcOrd="0" destOrd="0" presId="urn:microsoft.com/office/officeart/2005/8/layout/list1"/>
     <dgm:cxn modelId="{FE8DE26B-BE19-4828-A822-C5FFD39F086C}" type="presParOf" srcId="{DD69F0F8-C7C4-4EF4-8C1C-51E0155113CE}" destId="{2AC9D863-F73C-450B-9D85-60B005DA622F}" srcOrd="0" destOrd="0" presId="urn:microsoft.com/office/officeart/2005/8/layout/list1"/>
     <dgm:cxn modelId="{D99899A1-5174-4AE1-B68C-888903C0F203}" type="presParOf" srcId="{2AC9D863-F73C-450B-9D85-60B005DA622F}" destId="{81666E97-5860-45F1-88A5-99FAA589A582}" srcOrd="0" destOrd="0" presId="urn:microsoft.com/office/officeart/2005/8/layout/list1"/>
     <dgm:cxn modelId="{8E54FAD1-7DFD-4CAB-B580-2BCDC72E2854}" type="presParOf" srcId="{2AC9D863-F73C-450B-9D85-60B005DA622F}" destId="{E1A9A929-FEE8-4155-9F48-FAC5EE533310}" srcOrd="1" destOrd="0" presId="urn:microsoft.com/office/officeart/2005/8/layout/list1"/>
@@ -3759,14 +3838,35 @@
         </dgm:presLayoutVars>
       </dgm:prSet>
       <dgm:spPr/>
+      <dgm:t>
+        <a:bodyPr/>
+        <a:lstStyle/>
+        <a:p>
+          <a:endParaRPr lang="en-US"/>
+        </a:p>
+      </dgm:t>
     </dgm:pt>
     <dgm:pt modelId="{C5BE00BD-745C-43E7-912B-9157D7920E0A}" type="pres">
       <dgm:prSet presAssocID="{50A8F3E4-F51A-4E67-BB1C-EFC8155DD776}" presName="sibTrans" presStyleLbl="sibTrans2D1" presStyleIdx="0" presStyleCnt="2"/>
       <dgm:spPr/>
+      <dgm:t>
+        <a:bodyPr/>
+        <a:lstStyle/>
+        <a:p>
+          <a:endParaRPr lang="en-US"/>
+        </a:p>
+      </dgm:t>
     </dgm:pt>
     <dgm:pt modelId="{5EF98626-1B98-4F0E-B74A-248A9D343D4B}" type="pres">
       <dgm:prSet presAssocID="{50A8F3E4-F51A-4E67-BB1C-EFC8155DD776}" presName="connectorText" presStyleLbl="sibTrans2D1" presStyleIdx="0" presStyleCnt="2"/>
       <dgm:spPr/>
+      <dgm:t>
+        <a:bodyPr/>
+        <a:lstStyle/>
+        <a:p>
+          <a:endParaRPr lang="en-US"/>
+        </a:p>
+      </dgm:t>
     </dgm:pt>
     <dgm:pt modelId="{BFBD83CE-AD3D-4B36-AFD4-F505FE96449E}" type="pres">
       <dgm:prSet presAssocID="{0E522B13-F764-4BC6-83A0-CA4F5944C6E0}" presName="node" presStyleLbl="node1" presStyleIdx="1" presStyleCnt="3">
@@ -3786,10 +3886,24 @@
     <dgm:pt modelId="{30F2A522-5361-42FD-BDF3-9AAF9B6E48CD}" type="pres">
       <dgm:prSet presAssocID="{B7FC2DBC-2209-4B52-A6BB-A5B96B108E97}" presName="sibTrans" presStyleLbl="sibTrans2D1" presStyleIdx="1" presStyleCnt="2"/>
       <dgm:spPr/>
+      <dgm:t>
+        <a:bodyPr/>
+        <a:lstStyle/>
+        <a:p>
+          <a:endParaRPr lang="en-US"/>
+        </a:p>
+      </dgm:t>
     </dgm:pt>
     <dgm:pt modelId="{D7B61D4E-81AD-4336-8A85-CB458552E574}" type="pres">
       <dgm:prSet presAssocID="{B7FC2DBC-2209-4B52-A6BB-A5B96B108E97}" presName="connectorText" presStyleLbl="sibTrans2D1" presStyleIdx="1" presStyleCnt="2"/>
       <dgm:spPr/>
+      <dgm:t>
+        <a:bodyPr/>
+        <a:lstStyle/>
+        <a:p>
+          <a:endParaRPr lang="en-US"/>
+        </a:p>
+      </dgm:t>
     </dgm:pt>
     <dgm:pt modelId="{4DA5EE49-8168-4D22-9537-7BE4A3708548}" type="pres">
       <dgm:prSet presAssocID="{8CAA25DF-3B38-443D-A48F-CCAB7142450C}" presName="node" presStyleLbl="node1" presStyleIdx="2" presStyleCnt="3">
@@ -3798,18 +3912,25 @@
         </dgm:presLayoutVars>
       </dgm:prSet>
       <dgm:spPr/>
+      <dgm:t>
+        <a:bodyPr/>
+        <a:lstStyle/>
+        <a:p>
+          <a:endParaRPr lang="en-US"/>
+        </a:p>
+      </dgm:t>
     </dgm:pt>
   </dgm:ptLst>
   <dgm:cxnLst>
     <dgm:cxn modelId="{F18AB1FE-0025-496D-BE04-40DF17B8D59D}" type="presOf" srcId="{DC9B3652-DE2A-4335-B0FB-3045EDEEA6A8}" destId="{40A287E9-C42B-4334-9643-572CE6DD897B}" srcOrd="0" destOrd="0" presId="urn:microsoft.com/office/officeart/2005/8/layout/process2"/>
     <dgm:cxn modelId="{5BC899BC-FAF8-41E4-9EA1-66AA57398186}" type="presOf" srcId="{50A8F3E4-F51A-4E67-BB1C-EFC8155DD776}" destId="{C5BE00BD-745C-43E7-912B-9157D7920E0A}" srcOrd="0" destOrd="0" presId="urn:microsoft.com/office/officeart/2005/8/layout/process2"/>
+    <dgm:cxn modelId="{BAA27956-6A5E-4829-BFFD-6D60B13C8EAC}" type="presOf" srcId="{0E522B13-F764-4BC6-83A0-CA4F5944C6E0}" destId="{BFBD83CE-AD3D-4B36-AFD4-F505FE96449E}" srcOrd="0" destOrd="0" presId="urn:microsoft.com/office/officeart/2005/8/layout/process2"/>
     <dgm:cxn modelId="{0F92CF51-8E61-460B-8E99-6FCFD7D21AC4}" type="presOf" srcId="{3ED2506A-D607-4A12-8A50-AC72420F3F00}" destId="{715D256F-02F7-4191-B84E-3A4C6CD8FFC5}" srcOrd="0" destOrd="0" presId="urn:microsoft.com/office/officeart/2005/8/layout/process2"/>
-    <dgm:cxn modelId="{BAA27956-6A5E-4829-BFFD-6D60B13C8EAC}" type="presOf" srcId="{0E522B13-F764-4BC6-83A0-CA4F5944C6E0}" destId="{BFBD83CE-AD3D-4B36-AFD4-F505FE96449E}" srcOrd="0" destOrd="0" presId="urn:microsoft.com/office/officeart/2005/8/layout/process2"/>
     <dgm:cxn modelId="{E8BC3270-1B78-42AA-98F0-9309B2A170EE}" type="presOf" srcId="{8CAA25DF-3B38-443D-A48F-CCAB7142450C}" destId="{4DA5EE49-8168-4D22-9537-7BE4A3708548}" srcOrd="0" destOrd="0" presId="urn:microsoft.com/office/officeart/2005/8/layout/process2"/>
     <dgm:cxn modelId="{B120A2B9-9B85-406D-954D-6713BD88FF5C}" srcId="{DC9B3652-DE2A-4335-B0FB-3045EDEEA6A8}" destId="{3ED2506A-D607-4A12-8A50-AC72420F3F00}" srcOrd="0" destOrd="0" parTransId="{E8D3A7A7-32F7-4A63-91CB-C04C53F7C046}" sibTransId="{50A8F3E4-F51A-4E67-BB1C-EFC8155DD776}"/>
     <dgm:cxn modelId="{442EB815-09F3-4564-824E-AF9A49E81176}" srcId="{DC9B3652-DE2A-4335-B0FB-3045EDEEA6A8}" destId="{0E522B13-F764-4BC6-83A0-CA4F5944C6E0}" srcOrd="1" destOrd="0" parTransId="{D0C64C9C-06C7-4696-B64E-72EB6765D37D}" sibTransId="{B7FC2DBC-2209-4B52-A6BB-A5B96B108E97}"/>
+    <dgm:cxn modelId="{B5133DE3-4354-4D03-B7CF-D23477E96DD9}" srcId="{DC9B3652-DE2A-4335-B0FB-3045EDEEA6A8}" destId="{8CAA25DF-3B38-443D-A48F-CCAB7142450C}" srcOrd="2" destOrd="0" parTransId="{4BD1F383-75F3-4570-947F-2F89081482BF}" sibTransId="{186EB40E-0379-4173-8900-E632C05B1B0B}"/>
     <dgm:cxn modelId="{1E76EC3B-6F04-4B8F-9B08-F745AF155804}" type="presOf" srcId="{B7FC2DBC-2209-4B52-A6BB-A5B96B108E97}" destId="{30F2A522-5361-42FD-BDF3-9AAF9B6E48CD}" srcOrd="0" destOrd="0" presId="urn:microsoft.com/office/officeart/2005/8/layout/process2"/>
-    <dgm:cxn modelId="{B5133DE3-4354-4D03-B7CF-D23477E96DD9}" srcId="{DC9B3652-DE2A-4335-B0FB-3045EDEEA6A8}" destId="{8CAA25DF-3B38-443D-A48F-CCAB7142450C}" srcOrd="2" destOrd="0" parTransId="{4BD1F383-75F3-4570-947F-2F89081482BF}" sibTransId="{186EB40E-0379-4173-8900-E632C05B1B0B}"/>
     <dgm:cxn modelId="{8181B420-CCBA-47B0-99DB-8B0F75FCFC67}" type="presOf" srcId="{50A8F3E4-F51A-4E67-BB1C-EFC8155DD776}" destId="{5EF98626-1B98-4F0E-B74A-248A9D343D4B}" srcOrd="1" destOrd="0" presId="urn:microsoft.com/office/officeart/2005/8/layout/process2"/>
     <dgm:cxn modelId="{801EFD6F-FC26-4BA6-AA03-29FB41AE3CC1}" type="presOf" srcId="{B7FC2DBC-2209-4B52-A6BB-A5B96B108E97}" destId="{D7B61D4E-81AD-4336-8A85-CB458552E574}" srcOrd="1" destOrd="0" presId="urn:microsoft.com/office/officeart/2005/8/layout/process2"/>
     <dgm:cxn modelId="{08C7413F-9BBB-42CA-B81C-A9C03F1F5B27}" type="presParOf" srcId="{40A287E9-C42B-4334-9643-572CE6DD897B}" destId="{715D256F-02F7-4191-B84E-3A4C6CD8FFC5}" srcOrd="0" destOrd="0" presId="urn:microsoft.com/office/officeart/2005/8/layout/process2"/>
@@ -3980,10 +4101,24 @@
     <dgm:pt modelId="{C5BE00BD-745C-43E7-912B-9157D7920E0A}" type="pres">
       <dgm:prSet presAssocID="{50A8F3E4-F51A-4E67-BB1C-EFC8155DD776}" presName="sibTrans" presStyleLbl="sibTrans2D1" presStyleIdx="0" presStyleCnt="2"/>
       <dgm:spPr/>
+      <dgm:t>
+        <a:bodyPr/>
+        <a:lstStyle/>
+        <a:p>
+          <a:endParaRPr lang="en-US"/>
+        </a:p>
+      </dgm:t>
     </dgm:pt>
     <dgm:pt modelId="{5EF98626-1B98-4F0E-B74A-248A9D343D4B}" type="pres">
       <dgm:prSet presAssocID="{50A8F3E4-F51A-4E67-BB1C-EFC8155DD776}" presName="connectorText" presStyleLbl="sibTrans2D1" presStyleIdx="0" presStyleCnt="2"/>
       <dgm:spPr/>
+      <dgm:t>
+        <a:bodyPr/>
+        <a:lstStyle/>
+        <a:p>
+          <a:endParaRPr lang="en-US"/>
+        </a:p>
+      </dgm:t>
     </dgm:pt>
     <dgm:pt modelId="{BFBD83CE-AD3D-4B36-AFD4-F505FE96449E}" type="pres">
       <dgm:prSet presAssocID="{0E522B13-F764-4BC6-83A0-CA4F5944C6E0}" presName="node" presStyleLbl="node1" presStyleIdx="1" presStyleCnt="3">
@@ -4003,10 +4138,24 @@
     <dgm:pt modelId="{30F2A522-5361-42FD-BDF3-9AAF9B6E48CD}" type="pres">
       <dgm:prSet presAssocID="{B7FC2DBC-2209-4B52-A6BB-A5B96B108E97}" presName="sibTrans" presStyleLbl="sibTrans2D1" presStyleIdx="1" presStyleCnt="2"/>
       <dgm:spPr/>
+      <dgm:t>
+        <a:bodyPr/>
+        <a:lstStyle/>
+        <a:p>
+          <a:endParaRPr lang="en-US"/>
+        </a:p>
+      </dgm:t>
     </dgm:pt>
     <dgm:pt modelId="{D7B61D4E-81AD-4336-8A85-CB458552E574}" type="pres">
       <dgm:prSet presAssocID="{B7FC2DBC-2209-4B52-A6BB-A5B96B108E97}" presName="connectorText" presStyleLbl="sibTrans2D1" presStyleIdx="1" presStyleCnt="2"/>
       <dgm:spPr/>
+      <dgm:t>
+        <a:bodyPr/>
+        <a:lstStyle/>
+        <a:p>
+          <a:endParaRPr lang="en-US"/>
+        </a:p>
+      </dgm:t>
     </dgm:pt>
     <dgm:pt modelId="{4DA5EE49-8168-4D22-9537-7BE4A3708548}" type="pres">
       <dgm:prSet presAssocID="{8CAA25DF-3B38-443D-A48F-CCAB7142450C}" presName="node" presStyleLbl="node1" presStyleIdx="2" presStyleCnt="3">
@@ -4025,17 +4174,17 @@
     </dgm:pt>
   </dgm:ptLst>
   <dgm:cxnLst>
+    <dgm:cxn modelId="{FCD099FA-4F06-4275-9DF4-7552D29FA9CB}" type="presOf" srcId="{3ED2506A-D607-4A12-8A50-AC72420F3F00}" destId="{715D256F-02F7-4191-B84E-3A4C6CD8FFC5}" srcOrd="0" destOrd="0" presId="urn:microsoft.com/office/officeart/2005/8/layout/process2"/>
+    <dgm:cxn modelId="{1417121F-BF3C-49F7-91CD-28895F1A9C54}" type="presOf" srcId="{50A8F3E4-F51A-4E67-BB1C-EFC8155DD776}" destId="{5EF98626-1B98-4F0E-B74A-248A9D343D4B}" srcOrd="1" destOrd="0" presId="urn:microsoft.com/office/officeart/2005/8/layout/process2"/>
+    <dgm:cxn modelId="{6811263B-3ADE-4806-BEED-B5669D3BD03F}" type="presOf" srcId="{50A8F3E4-F51A-4E67-BB1C-EFC8155DD776}" destId="{C5BE00BD-745C-43E7-912B-9157D7920E0A}" srcOrd="0" destOrd="0" presId="urn:microsoft.com/office/officeart/2005/8/layout/process2"/>
+    <dgm:cxn modelId="{3A49BE87-DDE8-4117-90E1-4D1F43716916}" type="presOf" srcId="{B7FC2DBC-2209-4B52-A6BB-A5B96B108E97}" destId="{30F2A522-5361-42FD-BDF3-9AAF9B6E48CD}" srcOrd="0" destOrd="0" presId="urn:microsoft.com/office/officeart/2005/8/layout/process2"/>
+    <dgm:cxn modelId="{3674EAE9-5C2E-4F0D-9BE7-5234E85DC312}" type="presOf" srcId="{8CAA25DF-3B38-443D-A48F-CCAB7142450C}" destId="{4DA5EE49-8168-4D22-9537-7BE4A3708548}" srcOrd="0" destOrd="0" presId="urn:microsoft.com/office/officeart/2005/8/layout/process2"/>
     <dgm:cxn modelId="{B120A2B9-9B85-406D-954D-6713BD88FF5C}" srcId="{DC9B3652-DE2A-4335-B0FB-3045EDEEA6A8}" destId="{3ED2506A-D607-4A12-8A50-AC72420F3F00}" srcOrd="0" destOrd="0" parTransId="{E8D3A7A7-32F7-4A63-91CB-C04C53F7C046}" sibTransId="{50A8F3E4-F51A-4E67-BB1C-EFC8155DD776}"/>
-    <dgm:cxn modelId="{FCD099FA-4F06-4275-9DF4-7552D29FA9CB}" type="presOf" srcId="{3ED2506A-D607-4A12-8A50-AC72420F3F00}" destId="{715D256F-02F7-4191-B84E-3A4C6CD8FFC5}" srcOrd="0" destOrd="0" presId="urn:microsoft.com/office/officeart/2005/8/layout/process2"/>
+    <dgm:cxn modelId="{1F632DDF-2108-42D1-8F30-E4933BE2547B}" type="presOf" srcId="{DC9B3652-DE2A-4335-B0FB-3045EDEEA6A8}" destId="{40A287E9-C42B-4334-9643-572CE6DD897B}" srcOrd="0" destOrd="0" presId="urn:microsoft.com/office/officeart/2005/8/layout/process2"/>
+    <dgm:cxn modelId="{442EB815-09F3-4564-824E-AF9A49E81176}" srcId="{DC9B3652-DE2A-4335-B0FB-3045EDEEA6A8}" destId="{0E522B13-F764-4BC6-83A0-CA4F5944C6E0}" srcOrd="1" destOrd="0" parTransId="{D0C64C9C-06C7-4696-B64E-72EB6765D37D}" sibTransId="{B7FC2DBC-2209-4B52-A6BB-A5B96B108E97}"/>
     <dgm:cxn modelId="{B5133DE3-4354-4D03-B7CF-D23477E96DD9}" srcId="{DC9B3652-DE2A-4335-B0FB-3045EDEEA6A8}" destId="{8CAA25DF-3B38-443D-A48F-CCAB7142450C}" srcOrd="2" destOrd="0" parTransId="{4BD1F383-75F3-4570-947F-2F89081482BF}" sibTransId="{186EB40E-0379-4173-8900-E632C05B1B0B}"/>
-    <dgm:cxn modelId="{442EB815-09F3-4564-824E-AF9A49E81176}" srcId="{DC9B3652-DE2A-4335-B0FB-3045EDEEA6A8}" destId="{0E522B13-F764-4BC6-83A0-CA4F5944C6E0}" srcOrd="1" destOrd="0" parTransId="{D0C64C9C-06C7-4696-B64E-72EB6765D37D}" sibTransId="{B7FC2DBC-2209-4B52-A6BB-A5B96B108E97}"/>
-    <dgm:cxn modelId="{1417121F-BF3C-49F7-91CD-28895F1A9C54}" type="presOf" srcId="{50A8F3E4-F51A-4E67-BB1C-EFC8155DD776}" destId="{5EF98626-1B98-4F0E-B74A-248A9D343D4B}" srcOrd="1" destOrd="0" presId="urn:microsoft.com/office/officeart/2005/8/layout/process2"/>
     <dgm:cxn modelId="{AEECC6F0-8467-4F89-8B15-DD935CF58F61}" type="presOf" srcId="{B7FC2DBC-2209-4B52-A6BB-A5B96B108E97}" destId="{D7B61D4E-81AD-4336-8A85-CB458552E574}" srcOrd="1" destOrd="0" presId="urn:microsoft.com/office/officeart/2005/8/layout/process2"/>
     <dgm:cxn modelId="{C028BE47-A9CE-4C17-A602-3B095B3FB67D}" type="presOf" srcId="{0E522B13-F764-4BC6-83A0-CA4F5944C6E0}" destId="{BFBD83CE-AD3D-4B36-AFD4-F505FE96449E}" srcOrd="0" destOrd="0" presId="urn:microsoft.com/office/officeart/2005/8/layout/process2"/>
-    <dgm:cxn modelId="{1F632DDF-2108-42D1-8F30-E4933BE2547B}" type="presOf" srcId="{DC9B3652-DE2A-4335-B0FB-3045EDEEA6A8}" destId="{40A287E9-C42B-4334-9643-572CE6DD897B}" srcOrd="0" destOrd="0" presId="urn:microsoft.com/office/officeart/2005/8/layout/process2"/>
-    <dgm:cxn modelId="{3A49BE87-DDE8-4117-90E1-4D1F43716916}" type="presOf" srcId="{B7FC2DBC-2209-4B52-A6BB-A5B96B108E97}" destId="{30F2A522-5361-42FD-BDF3-9AAF9B6E48CD}" srcOrd="0" destOrd="0" presId="urn:microsoft.com/office/officeart/2005/8/layout/process2"/>
-    <dgm:cxn modelId="{6811263B-3ADE-4806-BEED-B5669D3BD03F}" type="presOf" srcId="{50A8F3E4-F51A-4E67-BB1C-EFC8155DD776}" destId="{C5BE00BD-745C-43E7-912B-9157D7920E0A}" srcOrd="0" destOrd="0" presId="urn:microsoft.com/office/officeart/2005/8/layout/process2"/>
-    <dgm:cxn modelId="{3674EAE9-5C2E-4F0D-9BE7-5234E85DC312}" type="presOf" srcId="{8CAA25DF-3B38-443D-A48F-CCAB7142450C}" destId="{4DA5EE49-8168-4D22-9537-7BE4A3708548}" srcOrd="0" destOrd="0" presId="urn:microsoft.com/office/officeart/2005/8/layout/process2"/>
     <dgm:cxn modelId="{122CEEBD-C34A-4231-B9CB-A3E1F536048E}" type="presParOf" srcId="{40A287E9-C42B-4334-9643-572CE6DD897B}" destId="{715D256F-02F7-4191-B84E-3A4C6CD8FFC5}" srcOrd="0" destOrd="0" presId="urn:microsoft.com/office/officeart/2005/8/layout/process2"/>
     <dgm:cxn modelId="{F5362749-61C6-45FF-A9EB-47247277E8DC}" type="presParOf" srcId="{40A287E9-C42B-4334-9643-572CE6DD897B}" destId="{C5BE00BD-745C-43E7-912B-9157D7920E0A}" srcOrd="1" destOrd="0" presId="urn:microsoft.com/office/officeart/2005/8/layout/process2"/>
     <dgm:cxn modelId="{3890D6AB-0335-43DB-970C-C41282978FDA}" type="presParOf" srcId="{C5BE00BD-745C-43E7-912B-9157D7920E0A}" destId="{5EF98626-1B98-4F0E-B74A-248A9D343D4B}" srcOrd="0" destOrd="0" presId="urn:microsoft.com/office/officeart/2005/8/layout/process2"/>
@@ -4125,9 +4274,9 @@
     </dgm:pt>
   </dgm:ptLst>
   <dgm:cxnLst>
+    <dgm:cxn modelId="{9F31A86D-5448-46CD-B44D-6E6134C71B77}" type="presOf" srcId="{3ED2506A-D607-4A12-8A50-AC72420F3F00}" destId="{715D256F-02F7-4191-B84E-3A4C6CD8FFC5}" srcOrd="0" destOrd="0" presId="urn:microsoft.com/office/officeart/2005/8/layout/process2"/>
+    <dgm:cxn modelId="{B120A2B9-9B85-406D-954D-6713BD88FF5C}" srcId="{DC9B3652-DE2A-4335-B0FB-3045EDEEA6A8}" destId="{3ED2506A-D607-4A12-8A50-AC72420F3F00}" srcOrd="0" destOrd="0" parTransId="{E8D3A7A7-32F7-4A63-91CB-C04C53F7C046}" sibTransId="{50A8F3E4-F51A-4E67-BB1C-EFC8155DD776}"/>
     <dgm:cxn modelId="{F663E511-5DFC-4BD8-970E-E70320934F90}" type="presOf" srcId="{DC9B3652-DE2A-4335-B0FB-3045EDEEA6A8}" destId="{40A287E9-C42B-4334-9643-572CE6DD897B}" srcOrd="0" destOrd="0" presId="urn:microsoft.com/office/officeart/2005/8/layout/process2"/>
-    <dgm:cxn modelId="{B120A2B9-9B85-406D-954D-6713BD88FF5C}" srcId="{DC9B3652-DE2A-4335-B0FB-3045EDEEA6A8}" destId="{3ED2506A-D607-4A12-8A50-AC72420F3F00}" srcOrd="0" destOrd="0" parTransId="{E8D3A7A7-32F7-4A63-91CB-C04C53F7C046}" sibTransId="{50A8F3E4-F51A-4E67-BB1C-EFC8155DD776}"/>
-    <dgm:cxn modelId="{9F31A86D-5448-46CD-B44D-6E6134C71B77}" type="presOf" srcId="{3ED2506A-D607-4A12-8A50-AC72420F3F00}" destId="{715D256F-02F7-4191-B84E-3A4C6CD8FFC5}" srcOrd="0" destOrd="0" presId="urn:microsoft.com/office/officeart/2005/8/layout/process2"/>
     <dgm:cxn modelId="{F35D26CC-F60F-4E50-B760-AB6DE78F4123}" type="presParOf" srcId="{40A287E9-C42B-4334-9643-572CE6DD897B}" destId="{715D256F-02F7-4191-B84E-3A4C6CD8FFC5}" srcOrd="0" destOrd="0" presId="urn:microsoft.com/office/officeart/2005/8/layout/process2"/>
   </dgm:cxnLst>
   <dgm:bg/>
@@ -17968,46 +18117,50 @@
           <a:p>
             <a:r>
               <a:rPr lang="en-US" dirty="0" smtClean="0"/>
-              <a:t>High Level Architecture</a:t>
+              <a:t>High Level </a:t>
+            </a:r>
+            <a:r>
+              <a:rPr lang="en-US" dirty="0" smtClean="0"/>
+              <a:t>Architecture –Architecture Overview</a:t>
             </a:r>
             <a:endParaRPr lang="en-US" dirty="0"/>
           </a:p>
         </p:txBody>
       </p:sp>
-      <p:sp>
-        <p:nvSpPr>
-          <p:cNvPr id="16389" name="Rectangle 5"/>
-          <p:cNvSpPr>
-            <a:spLocks noGrp="1" noChangeArrowheads="1"/>
-          </p:cNvSpPr>
+      <p:pic>
+        <p:nvPicPr>
+          <p:cNvPr id="5" name="Picture 2"/>
+          <p:cNvPicPr>
+            <a:picLocks noGrp="1" noChangeAspect="1" noChangeArrowheads="1"/>
+          </p:cNvPicPr>
           <p:nvPr>
-            <p:ph type="body" idx="1"/>
+            <p:ph idx="1"/>
           </p:nvPr>
-        </p:nvSpPr>
-        <p:spPr/>
-        <p:txBody>
-          <a:bodyPr/>
-          <a:lstStyle/>
-          <a:p>
-            <a:r>
-              <a:rPr lang="en-US" i="1" dirty="0" smtClean="0">
-                <a:solidFill>
-                  <a:srgbClr val="FF0000"/>
-                </a:solidFill>
-              </a:rPr>
-              <a:t>Pending to insert high level architecture.</a:t>
-            </a:r>
-            <a:endParaRPr lang="en-US" i="1" dirty="0">
-              <a:solidFill>
-                <a:srgbClr val="FF0000"/>
-              </a:solidFill>
-            </a:endParaRPr>
-          </a:p>
-          <a:p>
-            <a:endParaRPr lang="en-US" dirty="0"/>
-          </a:p>
-        </p:txBody>
-      </p:sp>
+        </p:nvPicPr>
+        <p:blipFill>
+          <a:blip r:embed="rId2" cstate="print"/>
+          <a:srcRect/>
+          <a:stretch>
+            <a:fillRect/>
+          </a:stretch>
+        </p:blipFill>
+        <p:spPr bwMode="auto">
+          <a:xfrm>
+            <a:off x="1066800" y="1676400"/>
+            <a:ext cx="6400800" cy="4529640"/>
+          </a:xfrm>
+          <a:prstGeom prst="rect">
+            <a:avLst/>
+          </a:prstGeom>
+          <a:noFill/>
+          <a:ln w="9525">
+            <a:noFill/>
+            <a:miter lim="800000"/>
+            <a:headEnd/>
+            <a:tailEnd/>
+          </a:ln>
+        </p:spPr>
+      </p:pic>
     </p:spTree>
   </p:cSld>
   <p:clrMapOvr>
@@ -18042,9 +18195,9 @@
       </p:grpSpPr>
       <p:sp>
         <p:nvSpPr>
-          <p:cNvPr id="4" name="Title 3"/>
+          <p:cNvPr id="16388" name="Rectangle 4"/>
           <p:cNvSpPr>
-            <a:spLocks noGrp="1"/>
+            <a:spLocks noGrp="1" noChangeArrowheads="1"/>
           </p:cNvSpPr>
           <p:nvPr>
             <p:ph type="title"/>
@@ -18057,30 +18210,11 @@
           <a:p>
             <a:r>
               <a:rPr lang="en-US" dirty="0" smtClean="0"/>
-              <a:t>Project Risks</a:t>
+              <a:t>High Level </a:t>
             </a:r>
-            <a:endParaRPr lang="en-US" dirty="0"/>
-          </a:p>
-        </p:txBody>
-      </p:sp>
-      <p:sp>
-        <p:nvSpPr>
-          <p:cNvPr id="5" name="Text Placeholder 4"/>
-          <p:cNvSpPr>
-            <a:spLocks noGrp="1"/>
-          </p:cNvSpPr>
-          <p:nvPr>
-            <p:ph type="body" idx="1"/>
-          </p:nvPr>
-        </p:nvSpPr>
-        <p:spPr/>
-        <p:txBody>
-          <a:bodyPr/>
-          <a:lstStyle/>
-          <a:p>
             <a:r>
               <a:rPr lang="en-US" dirty="0" smtClean="0"/>
-              <a:t>Volunteer Management System</a:t>
+              <a:t>Architecture – Overview of Components</a:t>
             </a:r>
             <a:endParaRPr lang="en-US" dirty="0"/>
           </a:p>
@@ -18088,7 +18222,7 @@
       </p:sp>
       <p:pic>
         <p:nvPicPr>
-          <p:cNvPr id="8194" name="Picture 2"/>
+          <p:cNvPr id="4" name="Picture 3"/>
           <p:cNvPicPr>
             <a:picLocks noChangeAspect="1" noChangeArrowheads="1"/>
           </p:cNvPicPr>
@@ -18103,8 +18237,8 @@
         </p:blipFill>
         <p:spPr bwMode="auto">
           <a:xfrm>
-            <a:off x="838200" y="228600"/>
-            <a:ext cx="6791326" cy="3824118"/>
+            <a:off x="457200" y="2209800"/>
+            <a:ext cx="8284273" cy="2895600"/>
           </a:xfrm>
           <a:prstGeom prst="rect">
             <a:avLst/>
@@ -18116,7 +18250,6 @@
             <a:headEnd/>
             <a:tailEnd/>
           </a:ln>
-          <a:effectLst/>
         </p:spPr>
       </p:pic>
     </p:spTree>
@@ -18314,6 +18447,212 @@
       </p:grpSpPr>
       <p:sp>
         <p:nvSpPr>
+          <p:cNvPr id="16388" name="Rectangle 4"/>
+          <p:cNvSpPr>
+            <a:spLocks noGrp="1" noChangeArrowheads="1"/>
+          </p:cNvSpPr>
+          <p:nvPr>
+            <p:ph type="title"/>
+          </p:nvPr>
+        </p:nvSpPr>
+        <p:spPr/>
+        <p:txBody>
+          <a:bodyPr/>
+          <a:lstStyle/>
+          <a:p>
+            <a:r>
+              <a:rPr lang="en-US" dirty="0" smtClean="0"/>
+              <a:t>High Level </a:t>
+            </a:r>
+            <a:r>
+              <a:rPr lang="en-US" dirty="0" smtClean="0"/>
+              <a:t>Architecture – </a:t>
+            </a:r>
+            <a:r>
+              <a:rPr lang="en-US" smtClean="0"/>
+              <a:t>Framework Overview</a:t>
+            </a:r>
+            <a:endParaRPr lang="en-US" dirty="0"/>
+          </a:p>
+        </p:txBody>
+      </p:sp>
+      <p:pic>
+        <p:nvPicPr>
+          <p:cNvPr id="6" name="Picture 2"/>
+          <p:cNvPicPr>
+            <a:picLocks noChangeAspect="1" noChangeArrowheads="1"/>
+          </p:cNvPicPr>
+          <p:nvPr/>
+        </p:nvPicPr>
+        <p:blipFill>
+          <a:blip r:embed="rId2" cstate="print"/>
+          <a:srcRect/>
+          <a:stretch>
+            <a:fillRect/>
+          </a:stretch>
+        </p:blipFill>
+        <p:spPr bwMode="auto">
+          <a:xfrm>
+            <a:off x="393441" y="2057400"/>
+            <a:ext cx="8369559" cy="3429000"/>
+          </a:xfrm>
+          <a:prstGeom prst="rect">
+            <a:avLst/>
+          </a:prstGeom>
+          <a:noFill/>
+          <a:ln w="9525">
+            <a:noFill/>
+            <a:miter lim="800000"/>
+            <a:headEnd/>
+            <a:tailEnd/>
+          </a:ln>
+        </p:spPr>
+      </p:pic>
+    </p:spTree>
+  </p:cSld>
+  <p:clrMapOvr>
+    <a:masterClrMapping/>
+  </p:clrMapOvr>
+  <p:timing>
+    <p:tnLst>
+      <p:par>
+        <p:cTn id="1" dur="indefinite" restart="never" nodeType="tmRoot"/>
+      </p:par>
+    </p:tnLst>
+  </p:timing>
+</p:sld>
+</file>
+
+<file path=ppt/slides/slide21.xml><?xml version="1.0" encoding="utf-8"?>
+<p:sld xmlns:a="http://schemas.openxmlformats.org/drawingml/2006/main" xmlns:r="http://schemas.openxmlformats.org/officeDocument/2006/relationships" xmlns:p="http://schemas.openxmlformats.org/presentationml/2006/main">
+  <p:cSld>
+    <p:spTree>
+      <p:nvGrpSpPr>
+        <p:cNvPr id="1" name=""/>
+        <p:cNvGrpSpPr/>
+        <p:nvPr/>
+      </p:nvGrpSpPr>
+      <p:grpSpPr>
+        <a:xfrm>
+          <a:off x="0" y="0"/>
+          <a:ext cx="0" cy="0"/>
+          <a:chOff x="0" y="0"/>
+          <a:chExt cx="0" cy="0"/>
+        </a:xfrm>
+      </p:grpSpPr>
+      <p:sp>
+        <p:nvSpPr>
+          <p:cNvPr id="4" name="Title 3"/>
+          <p:cNvSpPr>
+            <a:spLocks noGrp="1"/>
+          </p:cNvSpPr>
+          <p:nvPr>
+            <p:ph type="title"/>
+          </p:nvPr>
+        </p:nvSpPr>
+        <p:spPr/>
+        <p:txBody>
+          <a:bodyPr/>
+          <a:lstStyle/>
+          <a:p>
+            <a:r>
+              <a:rPr lang="en-US" dirty="0" smtClean="0"/>
+              <a:t>Project Risks</a:t>
+            </a:r>
+            <a:endParaRPr lang="en-US" dirty="0"/>
+          </a:p>
+        </p:txBody>
+      </p:sp>
+      <p:sp>
+        <p:nvSpPr>
+          <p:cNvPr id="5" name="Text Placeholder 4"/>
+          <p:cNvSpPr>
+            <a:spLocks noGrp="1"/>
+          </p:cNvSpPr>
+          <p:nvPr>
+            <p:ph type="body" idx="1"/>
+          </p:nvPr>
+        </p:nvSpPr>
+        <p:spPr/>
+        <p:txBody>
+          <a:bodyPr/>
+          <a:lstStyle/>
+          <a:p>
+            <a:r>
+              <a:rPr lang="en-US" dirty="0" smtClean="0"/>
+              <a:t>Volunteer Management System</a:t>
+            </a:r>
+            <a:endParaRPr lang="en-US" dirty="0"/>
+          </a:p>
+        </p:txBody>
+      </p:sp>
+      <p:pic>
+        <p:nvPicPr>
+          <p:cNvPr id="8194" name="Picture 2"/>
+          <p:cNvPicPr>
+            <a:picLocks noChangeAspect="1" noChangeArrowheads="1"/>
+          </p:cNvPicPr>
+          <p:nvPr/>
+        </p:nvPicPr>
+        <p:blipFill>
+          <a:blip r:embed="rId2" cstate="print"/>
+          <a:srcRect/>
+          <a:stretch>
+            <a:fillRect/>
+          </a:stretch>
+        </p:blipFill>
+        <p:spPr bwMode="auto">
+          <a:xfrm>
+            <a:off x="838200" y="228600"/>
+            <a:ext cx="6791326" cy="3824118"/>
+          </a:xfrm>
+          <a:prstGeom prst="rect">
+            <a:avLst/>
+          </a:prstGeom>
+          <a:noFill/>
+          <a:ln w="9525">
+            <a:noFill/>
+            <a:miter lim="800000"/>
+            <a:headEnd/>
+            <a:tailEnd/>
+          </a:ln>
+          <a:effectLst/>
+        </p:spPr>
+      </p:pic>
+    </p:spTree>
+  </p:cSld>
+  <p:clrMapOvr>
+    <a:masterClrMapping/>
+  </p:clrMapOvr>
+  <p:timing>
+    <p:tnLst>
+      <p:par>
+        <p:cTn id="1" dur="indefinite" restart="never" nodeType="tmRoot"/>
+      </p:par>
+    </p:tnLst>
+  </p:timing>
+</p:sld>
+</file>
+
+<file path=ppt/slides/slide22.xml><?xml version="1.0" encoding="utf-8"?>
+<p:sld xmlns:a="http://schemas.openxmlformats.org/drawingml/2006/main" xmlns:r="http://schemas.openxmlformats.org/officeDocument/2006/relationships" xmlns:p="http://schemas.openxmlformats.org/presentationml/2006/main">
+  <p:cSld>
+    <p:spTree>
+      <p:nvGrpSpPr>
+        <p:cNvPr id="1" name=""/>
+        <p:cNvGrpSpPr/>
+        <p:nvPr/>
+      </p:nvGrpSpPr>
+      <p:grpSpPr>
+        <a:xfrm>
+          <a:off x="0" y="0"/>
+          <a:ext cx="0" cy="0"/>
+          <a:chOff x="0" y="0"/>
+          <a:chExt cx="0" cy="0"/>
+        </a:xfrm>
+      </p:grpSpPr>
+      <p:sp>
+        <p:nvSpPr>
           <p:cNvPr id="15364" name="Rectangle 4"/>
           <p:cNvSpPr>
             <a:spLocks noGrp="1" noChangeArrowheads="1"/>
@@ -18381,7 +18720,7 @@
 </p:sld>
 </file>
 
-<file path=ppt/slides/slide21.xml><?xml version="1.0" encoding="utf-8"?>
+<file path=ppt/slides/slide23.xml><?xml version="1.0" encoding="utf-8"?>
 <p:sld xmlns:a="http://schemas.openxmlformats.org/drawingml/2006/main" xmlns:r="http://schemas.openxmlformats.org/officeDocument/2006/relationships" xmlns:p="http://schemas.openxmlformats.org/presentationml/2006/main">
   <p:cSld>
     <p:spTree>
@@ -18492,7 +18831,7 @@
 </p:sld>
 </file>
 
-<file path=ppt/slides/slide22.xml><?xml version="1.0" encoding="utf-8"?>
+<file path=ppt/slides/slide24.xml><?xml version="1.0" encoding="utf-8"?>
 <p:sld xmlns:a="http://schemas.openxmlformats.org/drawingml/2006/main" xmlns:r="http://schemas.openxmlformats.org/officeDocument/2006/relationships" xmlns:p="http://schemas.openxmlformats.org/presentationml/2006/main">
   <p:cSld>
     <p:spTree>
@@ -18642,7 +18981,7 @@
 </p:sld>
 </file>
 
-<file path=ppt/slides/slide23.xml><?xml version="1.0" encoding="utf-8"?>
+<file path=ppt/slides/slide25.xml><?xml version="1.0" encoding="utf-8"?>
 <p:sld xmlns:a="http://schemas.openxmlformats.org/drawingml/2006/main" xmlns:r="http://schemas.openxmlformats.org/officeDocument/2006/relationships" xmlns:p="http://schemas.openxmlformats.org/presentationml/2006/main">
   <p:cSld>
     <p:spTree>
@@ -19402,7 +19741,7 @@
 </p:sld>
 </file>
 
-<file path=ppt/slides/slide24.xml><?xml version="1.0" encoding="utf-8"?>
+<file path=ppt/slides/slide26.xml><?xml version="1.0" encoding="utf-8"?>
 <p:sld xmlns:a="http://schemas.openxmlformats.org/drawingml/2006/main" xmlns:r="http://schemas.openxmlformats.org/officeDocument/2006/relationships" xmlns:p="http://schemas.openxmlformats.org/presentationml/2006/main">
   <p:cSld>
     <p:spTree>

</xml_diff>